<commit_message>
add some 3d objects detection
</commit_message>
<xml_diff>
--- a/document/材料.pptx
+++ b/document/材料.pptx
@@ -6,6 +6,7 @@
   </p:sldMasterIdLst>
   <p:sldIdLst>
     <p:sldId id="256" r:id="rId3"/>
+    <p:sldId id="257" r:id="rId4"/>
   </p:sldIdLst>
   <p:sldSz cx="12192000" cy="6858000"/>
   <p:notesSz cx="6858000" cy="9144000"/>
@@ -2922,7 +2923,7 @@
         </p:nvSpPr>
         <p:spPr>
           <a:xfrm>
-            <a:off x="1400175" y="2468245"/>
+            <a:off x="1400175" y="1716405"/>
             <a:ext cx="643890" cy="242570"/>
           </a:xfrm>
           <a:prstGeom prst="rect">
@@ -2961,7 +2962,7 @@
         </p:nvSpPr>
         <p:spPr>
           <a:xfrm>
-            <a:off x="2750820" y="2457450"/>
+            <a:off x="2750820" y="1705610"/>
             <a:ext cx="643890" cy="242570"/>
           </a:xfrm>
           <a:prstGeom prst="rect">
@@ -3000,7 +3001,7 @@
         </p:nvSpPr>
         <p:spPr>
           <a:xfrm>
-            <a:off x="4196080" y="2468245"/>
+            <a:off x="4196080" y="1716405"/>
             <a:ext cx="643890" cy="242570"/>
           </a:xfrm>
           <a:prstGeom prst="rect">
@@ -3039,7 +3040,7 @@
         </p:nvSpPr>
         <p:spPr>
           <a:xfrm>
-            <a:off x="1484630" y="2964180"/>
+            <a:off x="1484630" y="2212340"/>
             <a:ext cx="474980" cy="368300"/>
           </a:xfrm>
           <a:prstGeom prst="rect">
@@ -3068,7 +3069,7 @@
         </p:nvSpPr>
         <p:spPr>
           <a:xfrm>
-            <a:off x="2835275" y="2964180"/>
+            <a:off x="2835275" y="2212340"/>
             <a:ext cx="474980" cy="368300"/>
           </a:xfrm>
           <a:prstGeom prst="rect">
@@ -3097,7 +3098,7 @@
         </p:nvSpPr>
         <p:spPr>
           <a:xfrm>
-            <a:off x="4280535" y="2964180"/>
+            <a:off x="4280535" y="2212340"/>
             <a:ext cx="474980" cy="368300"/>
           </a:xfrm>
           <a:prstGeom prst="rect">
@@ -3126,7 +3127,7 @@
         </p:nvSpPr>
         <p:spPr>
           <a:xfrm>
-            <a:off x="1400175" y="1096645"/>
+            <a:off x="1400175" y="344805"/>
             <a:ext cx="338455" cy="242570"/>
           </a:xfrm>
           <a:prstGeom prst="rect">
@@ -3168,7 +3169,7 @@
         </p:nvCxnSpPr>
         <p:spPr>
           <a:xfrm flipH="1" flipV="1">
-            <a:off x="1569720" y="1339215"/>
+            <a:off x="1569720" y="577215"/>
             <a:ext cx="152400" cy="1129030"/>
           </a:xfrm>
           <a:prstGeom prst="straightConnector1">
@@ -3203,7 +3204,7 @@
         </p:nvCxnSpPr>
         <p:spPr>
           <a:xfrm flipH="1" flipV="1">
-            <a:off x="1569720" y="1339215"/>
+            <a:off x="1569720" y="577215"/>
             <a:ext cx="1503045" cy="1118235"/>
           </a:xfrm>
           <a:prstGeom prst="straightConnector1">
@@ -3238,7 +3239,7 @@
         </p:nvCxnSpPr>
         <p:spPr>
           <a:xfrm flipH="1" flipV="1">
-            <a:off x="1569720" y="1339215"/>
+            <a:off x="1569720" y="577215"/>
             <a:ext cx="2895600" cy="1118235"/>
           </a:xfrm>
           <a:prstGeom prst="straightConnector1">
@@ -3271,7 +3272,7 @@
         </p:nvSpPr>
         <p:spPr>
           <a:xfrm>
-            <a:off x="1738630" y="1096645"/>
+            <a:off x="1738630" y="344805"/>
             <a:ext cx="76200" cy="242570"/>
           </a:xfrm>
           <a:prstGeom prst="rect">
@@ -3310,7 +3311,7 @@
         </p:nvSpPr>
         <p:spPr>
           <a:xfrm>
-            <a:off x="1814830" y="1096645"/>
+            <a:off x="1814830" y="344805"/>
             <a:ext cx="229870" cy="242570"/>
           </a:xfrm>
           <a:prstGeom prst="rect">
@@ -3349,7 +3350,7 @@
         </p:nvSpPr>
         <p:spPr>
           <a:xfrm>
-            <a:off x="1689100" y="1864995"/>
+            <a:off x="1689100" y="1113155"/>
             <a:ext cx="518795" cy="306705"/>
           </a:xfrm>
           <a:prstGeom prst="rect">
@@ -3378,7 +3379,7 @@
         </p:nvSpPr>
         <p:spPr>
           <a:xfrm>
-            <a:off x="2480310" y="1842770"/>
+            <a:off x="2480310" y="1090930"/>
             <a:ext cx="518795" cy="306705"/>
           </a:xfrm>
           <a:prstGeom prst="rect">
@@ -3407,7 +3408,7 @@
         </p:nvSpPr>
         <p:spPr>
           <a:xfrm>
-            <a:off x="3185160" y="1769745"/>
+            <a:off x="3185160" y="1017905"/>
             <a:ext cx="518795" cy="306705"/>
           </a:xfrm>
           <a:prstGeom prst="rect">
@@ -3428,6 +3429,226 @@
           </a:p>
         </p:txBody>
       </p:sp>
+      <p:graphicFrame>
+        <p:nvGraphicFramePr>
+          <p:cNvPr id="20" name="对象 19"/>
+          <p:cNvGraphicFramePr/>
+          <p:nvPr/>
+        </p:nvGraphicFramePr>
+        <p:xfrm>
+          <a:off x="5039995" y="3110230"/>
+          <a:ext cx="5733415" cy="2357755"/>
+        </p:xfrm>
+        <a:graphic>
+          <a:graphicData uri="http://schemas.openxmlformats.org/presentationml/2006/ole">
+            <mc:AlternateContent xmlns:mc="http://schemas.openxmlformats.org/markup-compatibility/2006">
+              <mc:Choice xmlns:v="urn:schemas-microsoft-com:vml" Requires="v">
+                <p:oleObj spid="_x0000_s21" name="" r:id="rId1" imgW="9366250" imgH="2355850" progId="Paint.Picture">
+                  <p:embed/>
+                </p:oleObj>
+              </mc:Choice>
+              <mc:Fallback>
+                <p:oleObj name="" r:id="rId1" imgW="9366250" imgH="2355850" progId="Paint.Picture">
+                  <p:embed/>
+                  <p:pic>
+                    <p:nvPicPr>
+                      <p:cNvPr id="0" name="图片 20"/>
+                      <p:cNvPicPr/>
+                      <p:nvPr/>
+                    </p:nvPicPr>
+                    <p:blipFill>
+                      <a:blip r:embed="rId2"/>
+                      <a:srcRect l="38832"/>
+                      <a:stretch>
+                        <a:fillRect/>
+                      </a:stretch>
+                    </p:blipFill>
+                    <p:spPr>
+                      <a:xfrm>
+                        <a:off x="5039995" y="3110230"/>
+                        <a:ext cx="5733415" cy="2357755"/>
+                      </a:xfrm>
+                      <a:prstGeom prst="rect">
+                        <a:avLst/>
+                      </a:prstGeom>
+                    </p:spPr>
+                  </p:pic>
+                </p:oleObj>
+              </mc:Fallback>
+            </mc:AlternateContent>
+          </a:graphicData>
+        </a:graphic>
+      </p:graphicFrame>
+      <p:sp>
+        <p:nvSpPr>
+          <p:cNvPr id="24" name="文本框 23"/>
+          <p:cNvSpPr txBox="1"/>
+          <p:nvPr/>
+        </p:nvSpPr>
+        <p:spPr>
+          <a:xfrm>
+            <a:off x="5488940" y="5051425"/>
+            <a:ext cx="1214120" cy="337185"/>
+          </a:xfrm>
+          <a:prstGeom prst="rect">
+            <a:avLst/>
+          </a:prstGeom>
+          <a:noFill/>
+        </p:spPr>
+        <p:txBody>
+          <a:bodyPr wrap="square" rtlCol="0">
+            <a:spAutoFit/>
+          </a:bodyPr>
+          <a:p>
+            <a:r>
+              <a:rPr lang="en-US" altLang="zh-CN" sz="1600"/>
+              <a:t>BEV queries</a:t>
+            </a:r>
+            <a:endParaRPr lang="en-US" altLang="zh-CN" sz="1600"/>
+          </a:p>
+        </p:txBody>
+      </p:sp>
+      <p:sp>
+        <p:nvSpPr>
+          <p:cNvPr id="25" name="矩形 24"/>
+          <p:cNvSpPr/>
+          <p:nvPr/>
+        </p:nvSpPr>
+        <p:spPr>
+          <a:xfrm>
+            <a:off x="2319655" y="3193415"/>
+            <a:ext cx="2690495" cy="2184400"/>
+          </a:xfrm>
+          <a:prstGeom prst="rect">
+            <a:avLst/>
+          </a:prstGeom>
+          <a:noFill/>
+          <a:ln>
+            <a:solidFill>
+              <a:schemeClr val="tx1"/>
+            </a:solidFill>
+            <a:prstDash val="dash"/>
+          </a:ln>
+        </p:spPr>
+        <p:style>
+          <a:lnRef idx="2">
+            <a:schemeClr val="accent1">
+              <a:shade val="50000"/>
+            </a:schemeClr>
+          </a:lnRef>
+          <a:fillRef idx="1">
+            <a:schemeClr val="accent1"/>
+          </a:fillRef>
+          <a:effectRef idx="0">
+            <a:schemeClr val="accent1"/>
+          </a:effectRef>
+          <a:fontRef idx="minor">
+            <a:schemeClr val="lt1"/>
+          </a:fontRef>
+        </p:style>
+        <p:txBody>
+          <a:bodyPr rtlCol="0" anchor="ctr"/>
+          <a:p>
+            <a:pPr algn="ctr"/>
+            <a:endParaRPr lang="zh-CN" altLang="en-US"/>
+          </a:p>
+        </p:txBody>
+      </p:sp>
+      <p:sp>
+        <p:nvSpPr>
+          <p:cNvPr id="26" name="文本框 25"/>
+          <p:cNvSpPr txBox="1"/>
+          <p:nvPr/>
+        </p:nvSpPr>
+        <p:spPr>
+          <a:xfrm>
+            <a:off x="2533015" y="4115435"/>
+            <a:ext cx="2456180" cy="368300"/>
+          </a:xfrm>
+          <a:prstGeom prst="rect">
+            <a:avLst/>
+          </a:prstGeom>
+          <a:noFill/>
+        </p:spPr>
+        <p:txBody>
+          <a:bodyPr wrap="square" rtlCol="0">
+            <a:spAutoFit/>
+          </a:bodyPr>
+          <a:p>
+            <a:r>
+              <a:rPr lang="en-US" altLang="zh-CN"/>
+              <a:t>image feature encoding</a:t>
+            </a:r>
+            <a:endParaRPr lang="en-US" altLang="zh-CN"/>
+          </a:p>
+        </p:txBody>
+      </p:sp>
+    </p:spTree>
+  </p:cSld>
+  <p:clrMapOvr>
+    <a:masterClrMapping/>
+  </p:clrMapOvr>
+</p:sld>
+</file>
+
+<file path=ppt/slides/slide2.xml><?xml version="1.0" encoding="utf-8"?>
+<p:sld xmlns:a="http://schemas.openxmlformats.org/drawingml/2006/main" xmlns:r="http://schemas.openxmlformats.org/officeDocument/2006/relationships" xmlns:p="http://schemas.openxmlformats.org/presentationml/2006/main">
+  <p:cSld>
+    <p:spTree>
+      <p:nvGrpSpPr>
+        <p:cNvPr id="1" name=""/>
+        <p:cNvGrpSpPr/>
+        <p:nvPr/>
+      </p:nvGrpSpPr>
+      <p:grpSpPr/>
+      <p:pic>
+        <p:nvPicPr>
+          <p:cNvPr id="4" name="图片 3"/>
+          <p:cNvPicPr>
+            <a:picLocks noChangeAspect="1"/>
+          </p:cNvPicPr>
+          <p:nvPr/>
+        </p:nvPicPr>
+        <p:blipFill>
+          <a:blip r:embed="rId1"/>
+          <a:stretch>
+            <a:fillRect/>
+          </a:stretch>
+        </p:blipFill>
+        <p:spPr>
+          <a:xfrm>
+            <a:off x="721995" y="-109220"/>
+            <a:ext cx="11001375" cy="2609850"/>
+          </a:xfrm>
+          <a:prstGeom prst="rect">
+            <a:avLst/>
+          </a:prstGeom>
+        </p:spPr>
+      </p:pic>
+      <p:pic>
+        <p:nvPicPr>
+          <p:cNvPr id="5" name="图片 4"/>
+          <p:cNvPicPr>
+            <a:picLocks noChangeAspect="1"/>
+          </p:cNvPicPr>
+          <p:nvPr/>
+        </p:nvPicPr>
+        <p:blipFill>
+          <a:blip r:embed="rId2"/>
+          <a:stretch>
+            <a:fillRect/>
+          </a:stretch>
+        </p:blipFill>
+        <p:spPr>
+          <a:xfrm>
+            <a:off x="595630" y="676275"/>
+            <a:ext cx="11001375" cy="6181725"/>
+          </a:xfrm>
+          <a:prstGeom prst="rect">
+            <a:avLst/>
+          </a:prstGeom>
+        </p:spPr>
+      </p:pic>
     </p:spTree>
   </p:cSld>
   <p:clrMapOvr>

</xml_diff>